<commit_message>
updated Day 8 training materials
</commit_message>
<xml_diff>
--- a/Day 7/Slides/3. Structure/structure-slides.pptx
+++ b/Day 7/Slides/3. Structure/structure-slides.pptx
@@ -5,24 +5,24 @@
     <p:sldMasterId id="2147483648" r:id="rId1"/>
   </p:sldMasterIdLst>
   <p:notesMasterIdLst>
-    <p:notesMasterId r:id="rId15"/>
+    <p:notesMasterId r:id="rId14"/>
   </p:notesMasterIdLst>
   <p:handoutMasterIdLst>
-    <p:handoutMasterId r:id="rId16"/>
+    <p:handoutMasterId r:id="rId15"/>
   </p:handoutMasterIdLst>
   <p:sldIdLst>
-    <p:sldId id="256" r:id="rId3"/>
-    <p:sldId id="257" r:id="rId4"/>
-    <p:sldId id="258" r:id="rId5"/>
-    <p:sldId id="259" r:id="rId6"/>
-    <p:sldId id="260" r:id="rId7"/>
-    <p:sldId id="261" r:id="rId8"/>
-    <p:sldId id="262" r:id="rId9"/>
-    <p:sldId id="263" r:id="rId10"/>
-    <p:sldId id="264" r:id="rId11"/>
-    <p:sldId id="266" r:id="rId12"/>
-    <p:sldId id="265" r:id="rId13"/>
-    <p:sldId id="267" r:id="rId14"/>
+    <p:sldId id="256" r:id="rId2"/>
+    <p:sldId id="257" r:id="rId3"/>
+    <p:sldId id="258" r:id="rId4"/>
+    <p:sldId id="259" r:id="rId5"/>
+    <p:sldId id="260" r:id="rId6"/>
+    <p:sldId id="261" r:id="rId7"/>
+    <p:sldId id="262" r:id="rId8"/>
+    <p:sldId id="263" r:id="rId9"/>
+    <p:sldId id="264" r:id="rId10"/>
+    <p:sldId id="266" r:id="rId11"/>
+    <p:sldId id="265" r:id="rId12"/>
+    <p:sldId id="267" r:id="rId13"/>
   </p:sldIdLst>
   <p:sldSz cx="16256000" cy="9144000"/>
   <p:notesSz cx="16256000" cy="9144000"/>
@@ -118,6 +118,22 @@
       </a:defRPr>
     </a:lvl9pPr>
   </p:defaultTextStyle>
+  <p:extLst>
+    <p:ext uri="{EFAFB233-063F-42B5-8137-9DF3F51BA10A}">
+      <p15:sldGuideLst xmlns:p15="http://schemas.microsoft.com/office/powerpoint/2012/main">
+        <p15:guide id="1" orient="horz" pos="2880">
+          <p15:clr>
+            <a:srgbClr val="A4A3A4"/>
+          </p15:clr>
+        </p15:guide>
+        <p15:guide id="2" pos="2160">
+          <p15:clr>
+            <a:srgbClr val="A4A3A4"/>
+          </p15:clr>
+        </p15:guide>
+      </p15:sldGuideLst>
+    </p:ext>
+  </p:extLst>
 </p:presentation>
 </file>
 
@@ -203,6 +219,7 @@
           <a:p>
             <a:fld id="{696C064A-D61B-4B21-B757-51A9B82445B8}" type="datetimeFigureOut">
               <a:rPr lang="en-US" smtClean="0"/>
+              <a:t>8/16/2023</a:t>
             </a:fld>
             <a:endParaRPr lang="en-US"/>
           </a:p>
@@ -268,12 +285,18 @@
           <a:p>
             <a:fld id="{50305E07-67EA-4042-A3F6-853A8AD8D209}" type="slidenum">
               <a:rPr lang="en-US" smtClean="0"/>
+              <a:t>‹#›</a:t>
             </a:fld>
             <a:endParaRPr lang="en-US"/>
           </a:p>
         </p:txBody>
       </p:sp>
     </p:spTree>
+    <p:extLst>
+      <p:ext uri="{BB962C8B-B14F-4D97-AF65-F5344CB8AC3E}">
+        <p14:creationId xmlns:p14="http://schemas.microsoft.com/office/powerpoint/2010/main" val="1"/>
+      </p:ext>
+    </p:extLst>
   </p:cSld>
   <p:clrMap bg1="lt1" tx1="dk1" bg2="lt2" tx2="dk2" accent1="accent1" accent2="accent2" accent3="accent3" accent4="accent4" accent5="accent5" accent6="accent6" hlink="hlink" folHlink="folHlink"/>
 </p:handoutMaster>
@@ -361,6 +384,7 @@
           <a:p>
             <a:fld id="{3EFD42F7-718C-4B98-AAEC-167E6DDD60A7}" type="datetimeFigureOut">
               <a:rPr lang="en-US" smtClean="0"/>
+              <a:t>8/16/2023</a:t>
             </a:fld>
             <a:endParaRPr lang="en-US"/>
           </a:p>
@@ -424,42 +448,37 @@
           <a:p>
             <a:pPr lvl="0"/>
             <a:r>
-              <a:rPr lang="en-US" smtClean="0"/>
+              <a:rPr lang="en-US"/>
               <a:t>Click to edit Master text styles</a:t>
             </a:r>
-            <a:endParaRPr lang="en-US" smtClean="0"/>
           </a:p>
           <a:p>
             <a:pPr lvl="1"/>
             <a:r>
-              <a:rPr lang="en-US" smtClean="0"/>
+              <a:rPr lang="en-US"/>
               <a:t>Second level</a:t>
             </a:r>
-            <a:endParaRPr lang="en-US" smtClean="0"/>
           </a:p>
           <a:p>
             <a:pPr lvl="2"/>
             <a:r>
-              <a:rPr lang="en-US" smtClean="0"/>
+              <a:rPr lang="en-US"/>
               <a:t>Third level</a:t>
             </a:r>
-            <a:endParaRPr lang="en-US" smtClean="0"/>
           </a:p>
           <a:p>
             <a:pPr lvl="3"/>
             <a:r>
-              <a:rPr lang="en-US" smtClean="0"/>
+              <a:rPr lang="en-US"/>
               <a:t>Fourth level</a:t>
             </a:r>
-            <a:endParaRPr lang="en-US" smtClean="0"/>
           </a:p>
           <a:p>
             <a:pPr lvl="4"/>
             <a:r>
-              <a:rPr lang="en-US" smtClean="0"/>
+              <a:rPr lang="en-US"/>
               <a:t>Fifth level</a:t>
             </a:r>
-            <a:endParaRPr lang="en-US"/>
           </a:p>
         </p:txBody>
       </p:sp>
@@ -523,6 +542,7 @@
           <a:p>
             <a:fld id="{21B2AA4F-B828-4D7C-AFD3-893933DAFCB4}" type="slidenum">
               <a:rPr lang="en-US" smtClean="0"/>
+              <a:t>‹#›</a:t>
             </a:fld>
             <a:endParaRPr lang="en-US"/>
           </a:p>
@@ -627,7 +647,7 @@
 </file>
 
 <file path=ppt/slideLayouts/slideLayout1.xml><?xml version="1.0" encoding="utf-8"?>
-<p:sldLayout xmlns:a="http://schemas.openxmlformats.org/drawingml/2006/main" xmlns:r="http://schemas.openxmlformats.org/officeDocument/2006/relationships" xmlns:p="http://schemas.openxmlformats.org/presentationml/2006/main" type="obj" preserve="1" showMasterSp="0">
+<p:sldLayout xmlns:a="http://schemas.openxmlformats.org/drawingml/2006/main" xmlns:r="http://schemas.openxmlformats.org/officeDocument/2006/relationships" xmlns:p="http://schemas.openxmlformats.org/presentationml/2006/main" showMasterSp="0" type="obj" preserve="1">
   <p:cSld name="Title Slide">
     <p:bg>
       <p:bgPr>
@@ -688,7 +708,9 @@
         <p:txBody>
           <a:bodyPr wrap="square" lIns="0" tIns="0" rIns="0" bIns="0" rtlCol="0"/>
           <a:lstStyle/>
-          <a:p/>
+          <a:p>
+            <a:endParaRPr/>
+          </a:p>
         </p:txBody>
       </p:sp>
       <p:sp>
@@ -725,7 +747,9 @@
               </a:defRPr>
             </a:lvl1pPr>
           </a:lstStyle>
-          <a:p/>
+          <a:p>
+            <a:endParaRPr/>
+          </a:p>
         </p:txBody>
       </p:sp>
       <p:sp>
@@ -756,7 +780,9 @@
               <a:defRPr/>
             </a:lvl1pPr>
           </a:lstStyle>
-          <a:p/>
+          <a:p>
+            <a:endParaRPr/>
+          </a:p>
         </p:txBody>
       </p:sp>
       <p:sp>
@@ -783,7 +809,9 @@
               </a:defRPr>
             </a:lvl1pPr>
           </a:lstStyle>
-          <a:p/>
+          <a:p>
+            <a:endParaRPr/>
+          </a:p>
         </p:txBody>
       </p:sp>
       <p:sp>
@@ -813,6 +841,7 @@
           <a:p>
             <a:fld id="{1D8BD707-D9CF-40AE-B4C6-C98DA3205C09}" type="datetimeFigureOut">
               <a:rPr lang="en-US"/>
+              <a:t>8/16/2023</a:t>
             </a:fld>
             <a:endParaRPr lang="en-US"/>
           </a:p>
@@ -845,6 +874,7 @@
           <a:p>
             <a:fld id="{B6F15528-21DE-4FAA-801E-634DDDAF4B2B}" type="slidenum">
               <a:rPr/>
+              <a:t>‹#›</a:t>
             </a:fld>
             <a:endParaRPr/>
           </a:p>
@@ -860,7 +890,7 @@
 </file>
 
 <file path=ppt/slideLayouts/slideLayout2.xml><?xml version="1.0" encoding="utf-8"?>
-<p:sldLayout xmlns:a="http://schemas.openxmlformats.org/drawingml/2006/main" xmlns:r="http://schemas.openxmlformats.org/officeDocument/2006/relationships" xmlns:p="http://schemas.openxmlformats.org/presentationml/2006/main" type="obj" preserve="1" showMasterSp="0">
+<p:sldLayout xmlns:a="http://schemas.openxmlformats.org/drawingml/2006/main" xmlns:r="http://schemas.openxmlformats.org/officeDocument/2006/relationships" xmlns:p="http://schemas.openxmlformats.org/presentationml/2006/main" showMasterSp="0" type="obj" preserve="1">
   <p:cSld name="Title and Content">
     <p:bg>
       <p:bgPr>
@@ -929,7 +959,9 @@
         <p:txBody>
           <a:bodyPr wrap="square" lIns="0" tIns="0" rIns="0" bIns="0" rtlCol="0"/>
           <a:lstStyle/>
-          <a:p/>
+          <a:p>
+            <a:endParaRPr/>
+          </a:p>
         </p:txBody>
       </p:sp>
       <p:sp>
@@ -956,7 +988,9 @@
               </a:defRPr>
             </a:lvl1pPr>
           </a:lstStyle>
-          <a:p/>
+          <a:p>
+            <a:endParaRPr/>
+          </a:p>
         </p:txBody>
       </p:sp>
       <p:sp>
@@ -981,7 +1015,9 @@
               </a:defRPr>
             </a:lvl1pPr>
           </a:lstStyle>
-          <a:p/>
+          <a:p>
+            <a:endParaRPr/>
+          </a:p>
         </p:txBody>
       </p:sp>
       <p:sp>
@@ -1008,7 +1044,9 @@
               </a:defRPr>
             </a:lvl1pPr>
           </a:lstStyle>
-          <a:p/>
+          <a:p>
+            <a:endParaRPr/>
+          </a:p>
         </p:txBody>
       </p:sp>
       <p:sp>
@@ -1038,6 +1076,7 @@
           <a:p>
             <a:fld id="{1D8BD707-D9CF-40AE-B4C6-C98DA3205C09}" type="datetimeFigureOut">
               <a:rPr lang="en-US"/>
+              <a:t>8/16/2023</a:t>
             </a:fld>
             <a:endParaRPr lang="en-US"/>
           </a:p>
@@ -1070,6 +1109,7 @@
           <a:p>
             <a:fld id="{B6F15528-21DE-4FAA-801E-634DDDAF4B2B}" type="slidenum">
               <a:rPr/>
+              <a:t>‹#›</a:t>
             </a:fld>
             <a:endParaRPr/>
           </a:p>
@@ -1085,7 +1125,7 @@
 </file>
 
 <file path=ppt/slideLayouts/slideLayout3.xml><?xml version="1.0" encoding="utf-8"?>
-<p:sldLayout xmlns:a="http://schemas.openxmlformats.org/drawingml/2006/main" xmlns:r="http://schemas.openxmlformats.org/officeDocument/2006/relationships" xmlns:p="http://schemas.openxmlformats.org/presentationml/2006/main" type="obj" preserve="1" showMasterSp="0">
+<p:sldLayout xmlns:a="http://schemas.openxmlformats.org/drawingml/2006/main" xmlns:r="http://schemas.openxmlformats.org/officeDocument/2006/relationships" xmlns:p="http://schemas.openxmlformats.org/presentationml/2006/main" showMasterSp="0" type="obj" preserve="1">
   <p:cSld name="Two Content">
     <p:bg>
       <p:bgPr>
@@ -1155,7 +1195,9 @@
               </a:defRPr>
             </a:lvl1pPr>
           </a:lstStyle>
-          <a:p/>
+          <a:p>
+            <a:endParaRPr/>
+          </a:p>
         </p:txBody>
       </p:sp>
       <p:sp>
@@ -1186,7 +1228,9 @@
               <a:defRPr/>
             </a:lvl1pPr>
           </a:lstStyle>
-          <a:p/>
+          <a:p>
+            <a:endParaRPr/>
+          </a:p>
         </p:txBody>
       </p:sp>
       <p:sp>
@@ -1217,7 +1261,9 @@
               <a:defRPr/>
             </a:lvl1pPr>
           </a:lstStyle>
-          <a:p/>
+          <a:p>
+            <a:endParaRPr/>
+          </a:p>
         </p:txBody>
       </p:sp>
       <p:sp>
@@ -1244,7 +1290,9 @@
               </a:defRPr>
             </a:lvl1pPr>
           </a:lstStyle>
-          <a:p/>
+          <a:p>
+            <a:endParaRPr/>
+          </a:p>
         </p:txBody>
       </p:sp>
       <p:sp>
@@ -1274,6 +1322,7 @@
           <a:p>
             <a:fld id="{1D8BD707-D9CF-40AE-B4C6-C98DA3205C09}" type="datetimeFigureOut">
               <a:rPr lang="en-US"/>
+              <a:t>8/16/2023</a:t>
             </a:fld>
             <a:endParaRPr lang="en-US"/>
           </a:p>
@@ -1306,6 +1355,7 @@
           <a:p>
             <a:fld id="{B6F15528-21DE-4FAA-801E-634DDDAF4B2B}" type="slidenum">
               <a:rPr/>
+              <a:t>‹#›</a:t>
             </a:fld>
             <a:endParaRPr/>
           </a:p>
@@ -1321,7 +1371,7 @@
 </file>
 
 <file path=ppt/slideLayouts/slideLayout4.xml><?xml version="1.0" encoding="utf-8"?>
-<p:sldLayout xmlns:a="http://schemas.openxmlformats.org/drawingml/2006/main" xmlns:r="http://schemas.openxmlformats.org/officeDocument/2006/relationships" xmlns:p="http://schemas.openxmlformats.org/presentationml/2006/main" type="obj" preserve="1" showMasterSp="0">
+<p:sldLayout xmlns:a="http://schemas.openxmlformats.org/drawingml/2006/main" xmlns:r="http://schemas.openxmlformats.org/officeDocument/2006/relationships" xmlns:p="http://schemas.openxmlformats.org/presentationml/2006/main" showMasterSp="0" type="obj" preserve="1">
   <p:cSld name="Title Only">
     <p:bg>
       <p:bgPr>
@@ -1382,7 +1432,9 @@
         <p:txBody>
           <a:bodyPr wrap="square" lIns="0" tIns="0" rIns="0" bIns="0" rtlCol="0"/>
           <a:lstStyle/>
-          <a:p/>
+          <a:p>
+            <a:endParaRPr/>
+          </a:p>
         </p:txBody>
       </p:sp>
       <p:sp>
@@ -1409,7 +1461,9 @@
               </a:defRPr>
             </a:lvl1pPr>
           </a:lstStyle>
-          <a:p/>
+          <a:p>
+            <a:endParaRPr/>
+          </a:p>
         </p:txBody>
       </p:sp>
       <p:sp>
@@ -1436,7 +1490,9 @@
               </a:defRPr>
             </a:lvl1pPr>
           </a:lstStyle>
-          <a:p/>
+          <a:p>
+            <a:endParaRPr/>
+          </a:p>
         </p:txBody>
       </p:sp>
       <p:sp>
@@ -1466,6 +1522,7 @@
           <a:p>
             <a:fld id="{1D8BD707-D9CF-40AE-B4C6-C98DA3205C09}" type="datetimeFigureOut">
               <a:rPr lang="en-US"/>
+              <a:t>8/16/2023</a:t>
             </a:fld>
             <a:endParaRPr lang="en-US"/>
           </a:p>
@@ -1498,6 +1555,7 @@
           <a:p>
             <a:fld id="{B6F15528-21DE-4FAA-801E-634DDDAF4B2B}" type="slidenum">
               <a:rPr/>
+              <a:t>‹#›</a:t>
             </a:fld>
             <a:endParaRPr/>
           </a:p>
@@ -1513,7 +1571,7 @@
 </file>
 
 <file path=ppt/slideLayouts/slideLayout5.xml><?xml version="1.0" encoding="utf-8"?>
-<p:sldLayout xmlns:a="http://schemas.openxmlformats.org/drawingml/2006/main" xmlns:r="http://schemas.openxmlformats.org/officeDocument/2006/relationships" xmlns:p="http://schemas.openxmlformats.org/presentationml/2006/main" type="obj" preserve="1" showMasterSp="0">
+<p:sldLayout xmlns:a="http://schemas.openxmlformats.org/drawingml/2006/main" xmlns:r="http://schemas.openxmlformats.org/officeDocument/2006/relationships" xmlns:p="http://schemas.openxmlformats.org/presentationml/2006/main" showMasterSp="0" type="obj" preserve="1">
   <p:cSld name="Blank">
     <p:bg>
       <p:bgPr>
@@ -1574,7 +1632,9 @@
         <p:txBody>
           <a:bodyPr wrap="square" lIns="0" tIns="0" rIns="0" bIns="0" rtlCol="0"/>
           <a:lstStyle/>
-          <a:p/>
+          <a:p>
+            <a:endParaRPr/>
+          </a:p>
         </p:txBody>
       </p:sp>
       <p:sp>
@@ -1601,7 +1661,9 @@
               </a:defRPr>
             </a:lvl1pPr>
           </a:lstStyle>
-          <a:p/>
+          <a:p>
+            <a:endParaRPr/>
+          </a:p>
         </p:txBody>
       </p:sp>
       <p:sp>
@@ -1631,6 +1693,7 @@
           <a:p>
             <a:fld id="{1D8BD707-D9CF-40AE-B4C6-C98DA3205C09}" type="datetimeFigureOut">
               <a:rPr lang="en-US"/>
+              <a:t>8/16/2023</a:t>
             </a:fld>
             <a:endParaRPr lang="en-US"/>
           </a:p>
@@ -1663,6 +1726,7 @@
           <a:p>
             <a:fld id="{B6F15528-21DE-4FAA-801E-634DDDAF4B2B}" type="slidenum">
               <a:rPr/>
+              <a:t>‹#›</a:t>
             </a:fld>
             <a:endParaRPr/>
           </a:p>
@@ -1736,7 +1800,9 @@
               </a:defRPr>
             </a:lvl1pPr>
           </a:lstStyle>
-          <a:p/>
+          <a:p>
+            <a:endParaRPr/>
+          </a:p>
         </p:txBody>
       </p:sp>
       <p:sp>
@@ -1771,7 +1837,9 @@
               </a:defRPr>
             </a:lvl1pPr>
           </a:lstStyle>
-          <a:p/>
+          <a:p>
+            <a:endParaRPr/>
+          </a:p>
         </p:txBody>
       </p:sp>
       <p:sp>
@@ -1808,7 +1876,9 @@
               </a:defRPr>
             </a:lvl1pPr>
           </a:lstStyle>
-          <a:p/>
+          <a:p>
+            <a:endParaRPr/>
+          </a:p>
         </p:txBody>
       </p:sp>
       <p:sp>
@@ -1848,6 +1918,7 @@
           <a:p>
             <a:fld id="{1D8BD707-D9CF-40AE-B4C6-C98DA3205C09}" type="datetimeFigureOut">
               <a:rPr lang="en-US"/>
+              <a:t>8/16/2023</a:t>
             </a:fld>
             <a:endParaRPr lang="en-US"/>
           </a:p>
@@ -1890,6 +1961,7 @@
           <a:p>
             <a:fld id="{B6F15528-21DE-4FAA-801E-634DDDAF4B2B}" type="slidenum">
               <a:rPr/>
+              <a:t>‹#›</a:t>
             </a:fld>
             <a:endParaRPr/>
           </a:p>
@@ -2074,7 +2146,7 @@
           <p:nvPr/>
         </p:nvPicPr>
         <p:blipFill>
-          <a:blip r:embed="rId1" cstate="print"/>
+          <a:blip r:embed="rId2" cstate="print"/>
           <a:stretch>
             <a:fillRect/>
           </a:stretch>
@@ -2147,9 +2219,11 @@
         <p:spPr/>
         <p:txBody>
           <a:bodyPr/>
+          <a:lstStyle/>
           <a:p>
             <a:fld id="{B6F15528-21DE-4FAA-801E-634DDDAF4B2B}" type="slidenum">
               <a:rPr/>
+              <a:t>1</a:t>
             </a:fld>
             <a:endParaRPr/>
           </a:p>
@@ -2363,9 +2437,11 @@
         <p:spPr/>
         <p:txBody>
           <a:bodyPr/>
+          <a:lstStyle/>
           <a:p>
             <a:fld id="{B6F15528-21DE-4FAA-801E-634DDDAF4B2B}" type="slidenum">
               <a:rPr/>
+              <a:t>10</a:t>
             </a:fld>
             <a:endParaRPr/>
           </a:p>
@@ -2446,7 +2522,7 @@
               </a:rPr>
               <a:t>storage</a:t>
             </a:r>
-            <a:endParaRPr sz="3200">
+            <a:endParaRPr sz="3200" dirty="0">
               <a:latin typeface="Verdana" panose="020B0604030504040204"/>
               <a:cs typeface="Verdana" panose="020B0604030504040204"/>
             </a:endParaRPr>
@@ -2523,7 +2599,7 @@
               </a:rPr>
               <a:t>info</a:t>
             </a:r>
-            <a:endParaRPr sz="3200">
+            <a:endParaRPr sz="3200" dirty="0">
               <a:latin typeface="Verdana" panose="020B0604030504040204"/>
               <a:cs typeface="Verdana" panose="020B0604030504040204"/>
             </a:endParaRPr>
@@ -2604,7 +2680,7 @@
               </a:rPr>
               <a:t>duplication</a:t>
             </a:r>
-            <a:endParaRPr sz="3200">
+            <a:endParaRPr sz="3200" dirty="0">
               <a:latin typeface="Verdana" panose="020B0604030504040204"/>
               <a:cs typeface="Verdana" panose="020B0604030504040204"/>
             </a:endParaRPr>
@@ -2618,7 +2694,7 @@
           <p:nvPr/>
         </p:nvPicPr>
         <p:blipFill>
-          <a:blip r:embed="rId1" cstate="print"/>
+          <a:blip r:embed="rId2" cstate="print"/>
           <a:srcRect b="18053"/>
           <a:stretch>
             <a:fillRect/>
@@ -2647,9 +2723,11 @@
         <p:spPr/>
         <p:txBody>
           <a:bodyPr/>
+          <a:lstStyle/>
           <a:p>
             <a:fld id="{B6F15528-21DE-4FAA-801E-634DDDAF4B2B}" type="slidenum">
               <a:rPr/>
+              <a:t>11</a:t>
             </a:fld>
             <a:endParaRPr/>
           </a:p>
@@ -2969,9 +3047,11 @@
         <p:spPr/>
         <p:txBody>
           <a:bodyPr/>
+          <a:lstStyle/>
           <a:p>
             <a:fld id="{B6F15528-21DE-4FAA-801E-634DDDAF4B2B}" type="slidenum">
               <a:rPr/>
+              <a:t>12</a:t>
             </a:fld>
             <a:endParaRPr/>
           </a:p>
@@ -3039,7 +3119,9 @@
         <p:txBody>
           <a:bodyPr wrap="square" lIns="0" tIns="0" rIns="0" bIns="0" rtlCol="0"/>
           <a:lstStyle/>
-          <a:p/>
+          <a:p>
+            <a:endParaRPr/>
+          </a:p>
         </p:txBody>
       </p:sp>
       <p:sp>
@@ -3340,9 +3422,11 @@
         <p:spPr/>
         <p:txBody>
           <a:bodyPr/>
+          <a:lstStyle/>
           <a:p>
             <a:fld id="{B6F15528-21DE-4FAA-801E-634DDDAF4B2B}" type="slidenum">
               <a:rPr/>
+              <a:t>2</a:t>
             </a:fld>
             <a:endParaRPr/>
           </a:p>
@@ -3410,7 +3494,9 @@
         <p:txBody>
           <a:bodyPr wrap="square" lIns="0" tIns="0" rIns="0" bIns="0" rtlCol="0"/>
           <a:lstStyle/>
-          <a:p/>
+          <a:p>
+            <a:endParaRPr/>
+          </a:p>
         </p:txBody>
       </p:sp>
       <p:sp>
@@ -3500,7 +3586,7 @@
           <p:nvPr/>
         </p:nvPicPr>
         <p:blipFill>
-          <a:blip r:embed="rId1" cstate="print"/>
+          <a:blip r:embed="rId2" cstate="print"/>
           <a:stretch>
             <a:fillRect/>
           </a:stretch>
@@ -3528,9 +3614,11 @@
         <p:spPr/>
         <p:txBody>
           <a:bodyPr/>
+          <a:lstStyle/>
           <a:p>
             <a:fld id="{B6F15528-21DE-4FAA-801E-634DDDAF4B2B}" type="slidenum">
               <a:rPr/>
+              <a:t>3</a:t>
             </a:fld>
             <a:endParaRPr/>
           </a:p>
@@ -3826,9 +3914,11 @@
         <p:spPr/>
         <p:txBody>
           <a:bodyPr/>
+          <a:lstStyle/>
           <a:p>
             <a:fld id="{B6F15528-21DE-4FAA-801E-634DDDAF4B2B}" type="slidenum">
               <a:rPr/>
+              <a:t>4</a:t>
             </a:fld>
             <a:endParaRPr/>
           </a:p>
@@ -3900,7 +3990,6 @@
               <a:rPr spc="30" dirty="0"/>
               <a:t>Directory</a:t>
             </a:r>
-            <a:endParaRPr spc="30" dirty="0"/>
           </a:p>
           <a:p>
             <a:pPr marL="2123440">
@@ -3915,7 +4004,6 @@
               <a:rPr spc="-75" dirty="0"/>
               <a:t>Tests</a:t>
             </a:r>
-            <a:endParaRPr spc="-75" dirty="0"/>
           </a:p>
         </p:txBody>
       </p:sp>
@@ -3983,7 +4071,7 @@
           <p:nvPr/>
         </p:nvPicPr>
         <p:blipFill>
-          <a:blip r:embed="rId1" cstate="print"/>
+          <a:blip r:embed="rId2" cstate="print"/>
           <a:stretch>
             <a:fillRect/>
           </a:stretch>
@@ -4011,9 +4099,11 @@
         <p:spPr/>
         <p:txBody>
           <a:bodyPr/>
+          <a:lstStyle/>
           <a:p>
             <a:fld id="{B6F15528-21DE-4FAA-801E-634DDDAF4B2B}" type="slidenum">
               <a:rPr/>
+              <a:t>5</a:t>
             </a:fld>
             <a:endParaRPr/>
           </a:p>
@@ -4081,7 +4171,6 @@
               <a:rPr spc="-110" dirty="0"/>
               <a:t>pom.xml</a:t>
             </a:r>
-            <a:endParaRPr spc="-110" dirty="0"/>
           </a:p>
         </p:txBody>
       </p:sp>
@@ -4093,7 +4182,7 @@
         </p:nvSpPr>
         <p:spPr>
           <a:xfrm>
-            <a:off x="927100" y="1671320"/>
+            <a:off x="1109980" y="1524000"/>
             <a:ext cx="12463780" cy="5765165"/>
           </a:xfrm>
           <a:prstGeom prst="rect">
@@ -4161,7 +4250,7 @@
                 </a:solidFill>
                 <a:latin typeface="Courier New" panose="02070309020205020404"/>
                 <a:cs typeface="Courier New" panose="02070309020205020404"/>
-                <a:hlinkClick r:id="rId1"/>
+                <a:hlinkClick r:id="rId2"/>
               </a:rPr>
               <a:t>"http://maven.apache.org/POM/4.0.0" </a:t>
             </a:r>
@@ -4199,49 +4288,49 @@
                 </a:solidFill>
                 <a:latin typeface="Courier New" panose="02070309020205020404"/>
                 <a:cs typeface="Courier New" panose="02070309020205020404"/>
+                <a:hlinkClick r:id="rId3"/>
+              </a:rPr>
+              <a:t>"http://www.w3.org/2001/XMLSchema-instance" </a:t>
+            </a:r>
+            <a:r>
+              <a:rPr sz="2800" spc="-1670" dirty="0">
+                <a:solidFill>
+                  <a:srgbClr val="3933FF"/>
+                </a:solidFill>
+                <a:latin typeface="Courier New" panose="02070309020205020404"/>
+                <a:cs typeface="Courier New" panose="02070309020205020404"/>
+              </a:rPr>
+              <a:t> </a:t>
+            </a:r>
+            <a:r>
+              <a:rPr sz="2800" spc="-5" dirty="0">
+                <a:solidFill>
+                  <a:srgbClr val="932192"/>
+                </a:solidFill>
+                <a:latin typeface="Courier New" panose="02070309020205020404"/>
+                <a:cs typeface="Courier New" panose="02070309020205020404"/>
+              </a:rPr>
+              <a:t>xsi:schemaLocation</a:t>
+            </a:r>
+            <a:r>
+              <a:rPr sz="2800" spc="-5" dirty="0">
+                <a:latin typeface="Courier New" panose="02070309020205020404"/>
+                <a:cs typeface="Courier New" panose="02070309020205020404"/>
+              </a:rPr>
+              <a:t>=</a:t>
+            </a:r>
+            <a:r>
+              <a:rPr sz="2800" spc="-5" dirty="0">
+                <a:solidFill>
+                  <a:srgbClr val="3933FF"/>
+                </a:solidFill>
+                <a:latin typeface="Courier New" panose="02070309020205020404"/>
+                <a:cs typeface="Courier New" panose="02070309020205020404"/>
                 <a:hlinkClick r:id="rId2"/>
               </a:rPr>
-              <a:t>"http://www.w3.org/2001/XMLSchema-instance" </a:t>
-            </a:r>
-            <a:r>
-              <a:rPr sz="2800" spc="-1670" dirty="0">
-                <a:solidFill>
-                  <a:srgbClr val="3933FF"/>
-                </a:solidFill>
-                <a:latin typeface="Courier New" panose="02070309020205020404"/>
-                <a:cs typeface="Courier New" panose="02070309020205020404"/>
-              </a:rPr>
-              <a:t> </a:t>
-            </a:r>
-            <a:r>
-              <a:rPr sz="2800" spc="-5" dirty="0">
-                <a:solidFill>
-                  <a:srgbClr val="932192"/>
-                </a:solidFill>
-                <a:latin typeface="Courier New" panose="02070309020205020404"/>
-                <a:cs typeface="Courier New" panose="02070309020205020404"/>
-              </a:rPr>
-              <a:t>xsi:schemaLocation</a:t>
-            </a:r>
-            <a:r>
-              <a:rPr sz="2800" spc="-5" dirty="0">
-                <a:latin typeface="Courier New" panose="02070309020205020404"/>
-                <a:cs typeface="Courier New" panose="02070309020205020404"/>
-              </a:rPr>
-              <a:t>=</a:t>
-            </a:r>
-            <a:r>
-              <a:rPr sz="2800" spc="-5" dirty="0">
-                <a:solidFill>
-                  <a:srgbClr val="3933FF"/>
-                </a:solidFill>
-                <a:latin typeface="Courier New" panose="02070309020205020404"/>
-                <a:cs typeface="Courier New" panose="02070309020205020404"/>
-                <a:hlinkClick r:id="rId1"/>
-              </a:rPr>
               <a:t>"http://maven.apache.org/POM/4.0.0</a:t>
             </a:r>
-            <a:endParaRPr sz="2800">
+            <a:endParaRPr sz="2800" dirty="0">
               <a:latin typeface="Courier New" panose="02070309020205020404"/>
               <a:cs typeface="Courier New" panose="02070309020205020404"/>
             </a:endParaRPr>
@@ -4262,7 +4351,7 @@
                 </a:solidFill>
                 <a:latin typeface="Courier New" panose="02070309020205020404"/>
                 <a:cs typeface="Courier New" panose="02070309020205020404"/>
-                <a:hlinkClick r:id="rId3"/>
+                <a:hlinkClick r:id="rId4"/>
               </a:rPr>
               <a:t>http://maven.apache.org/maven-v4_0_0.xsd"</a:t>
             </a:r>
@@ -4276,7 +4365,7 @@
               </a:rPr>
               <a:t>&gt;</a:t>
             </a:r>
-            <a:endParaRPr sz="2800">
+            <a:endParaRPr sz="2800" dirty="0">
               <a:latin typeface="Courier New" panose="02070309020205020404"/>
               <a:cs typeface="Courier New" panose="02070309020205020404"/>
             </a:endParaRPr>
@@ -4290,7 +4379,7 @@
                 <a:spcPts val="15"/>
               </a:spcBef>
             </a:pPr>
-            <a:endParaRPr sz="3550">
+            <a:endParaRPr sz="3550" dirty="0">
               <a:latin typeface="Courier New" panose="02070309020205020404"/>
               <a:cs typeface="Courier New" panose="02070309020205020404"/>
             </a:endParaRPr>
@@ -4371,7 +4460,7 @@
               </a:rPr>
               <a:t>&gt;</a:t>
             </a:r>
-            <a:endParaRPr sz="2800">
+            <a:endParaRPr sz="2800" dirty="0">
               <a:latin typeface="Courier New" panose="02070309020205020404"/>
               <a:cs typeface="Courier New" panose="02070309020205020404"/>
             </a:endParaRPr>
@@ -4452,7 +4541,7 @@
               </a:rPr>
               <a:t>&gt;</a:t>
             </a:r>
-            <a:endParaRPr sz="2800">
+            <a:endParaRPr sz="2800" dirty="0">
               <a:latin typeface="Courier New" panose="02070309020205020404"/>
               <a:cs typeface="Courier New" panose="02070309020205020404"/>
             </a:endParaRPr>
@@ -4533,7 +4622,7 @@
               </a:rPr>
               <a:t>&gt;</a:t>
             </a:r>
-            <a:endParaRPr sz="2800">
+            <a:endParaRPr sz="2800" dirty="0">
               <a:latin typeface="Courier New" panose="02070309020205020404"/>
               <a:cs typeface="Courier New" panose="02070309020205020404"/>
             </a:endParaRPr>
@@ -4614,7 +4703,7 @@
               </a:rPr>
               <a:t>&gt;</a:t>
             </a:r>
-            <a:endParaRPr sz="2800">
+            <a:endParaRPr sz="2800" dirty="0">
               <a:latin typeface="Courier New" panose="02070309020205020404"/>
               <a:cs typeface="Courier New" panose="02070309020205020404"/>
             </a:endParaRPr>
@@ -4638,7 +4727,7 @@
               </a:rPr>
               <a:t>&lt;packaging&gt;jar&lt;/packaging&gt;</a:t>
             </a:r>
-            <a:endParaRPr sz="2800">
+            <a:endParaRPr sz="2800" dirty="0">
               <a:latin typeface="Courier New" panose="02070309020205020404"/>
               <a:cs typeface="Courier New" panose="02070309020205020404"/>
             </a:endParaRPr>
@@ -4652,7 +4741,7 @@
                 <a:spcPts val="15"/>
               </a:spcBef>
             </a:pPr>
-            <a:endParaRPr sz="3550">
+            <a:endParaRPr sz="3550" dirty="0">
               <a:latin typeface="Courier New" panose="02070309020205020404"/>
               <a:cs typeface="Courier New" panose="02070309020205020404"/>
             </a:endParaRPr>
@@ -4693,7 +4782,7 @@
               </a:rPr>
               <a:t>&gt;</a:t>
             </a:r>
-            <a:endParaRPr sz="2800">
+            <a:endParaRPr sz="2800" dirty="0">
               <a:latin typeface="Courier New" panose="02070309020205020404"/>
               <a:cs typeface="Courier New" panose="02070309020205020404"/>
             </a:endParaRPr>
@@ -4713,9 +4802,11 @@
         <p:spPr/>
         <p:txBody>
           <a:bodyPr/>
+          <a:lstStyle/>
           <a:p>
             <a:fld id="{B6F15528-21DE-4FAA-801E-634DDDAF4B2B}" type="slidenum">
               <a:rPr/>
+              <a:t>6</a:t>
             </a:fld>
             <a:endParaRPr/>
           </a:p>
@@ -4849,7 +4940,7 @@
               </a:rPr>
               <a:t>Convention</a:t>
             </a:r>
-            <a:endParaRPr sz="3200"/>
+            <a:endParaRPr sz="3200" dirty="0"/>
           </a:p>
           <a:p>
             <a:pPr marL="12700" marR="5080">
@@ -4932,7 +5023,7 @@
               </a:rPr>
               <a:t>section</a:t>
             </a:r>
-            <a:endParaRPr sz="3200"/>
+            <a:endParaRPr sz="3200" dirty="0"/>
           </a:p>
         </p:txBody>
       </p:sp>
@@ -4949,9 +5040,11 @@
         <p:spPr/>
         <p:txBody>
           <a:bodyPr/>
+          <a:lstStyle/>
           <a:p>
             <a:fld id="{B6F15528-21DE-4FAA-801E-634DDDAF4B2B}" type="slidenum">
               <a:rPr/>
+              <a:t>7</a:t>
             </a:fld>
             <a:endParaRPr/>
           </a:p>
@@ -5039,7 +5132,6 @@
               <a:rPr spc="35" dirty="0"/>
               <a:t>dependency</a:t>
             </a:r>
-            <a:endParaRPr spc="35" dirty="0"/>
           </a:p>
         </p:txBody>
       </p:sp>
@@ -5119,7 +5211,7 @@
                 </a:solidFill>
                 <a:latin typeface="Courier New" panose="02070309020205020404"/>
                 <a:cs typeface="Courier New" panose="02070309020205020404"/>
-                <a:hlinkClick r:id="rId1"/>
+                <a:hlinkClick r:id="rId2"/>
               </a:rPr>
               <a:t>"http://maven.apache.org/POM/4.0.0" </a:t>
             </a:r>
@@ -5157,49 +5249,49 @@
                 </a:solidFill>
                 <a:latin typeface="Courier New" panose="02070309020205020404"/>
                 <a:cs typeface="Courier New" panose="02070309020205020404"/>
+                <a:hlinkClick r:id="rId3"/>
+              </a:rPr>
+              <a:t>"http://www.w3.org/2001/XMLSchema-instance" </a:t>
+            </a:r>
+            <a:r>
+              <a:rPr sz="2300" spc="-1370" dirty="0">
+                <a:solidFill>
+                  <a:srgbClr val="3933FF"/>
+                </a:solidFill>
+                <a:latin typeface="Courier New" panose="02070309020205020404"/>
+                <a:cs typeface="Courier New" panose="02070309020205020404"/>
+              </a:rPr>
+              <a:t> </a:t>
+            </a:r>
+            <a:r>
+              <a:rPr sz="2300" spc="-5" dirty="0">
+                <a:solidFill>
+                  <a:srgbClr val="932192"/>
+                </a:solidFill>
+                <a:latin typeface="Courier New" panose="02070309020205020404"/>
+                <a:cs typeface="Courier New" panose="02070309020205020404"/>
+              </a:rPr>
+              <a:t>xsi:schemaLocation</a:t>
+            </a:r>
+            <a:r>
+              <a:rPr sz="2300" spc="-5" dirty="0">
+                <a:latin typeface="Courier New" panose="02070309020205020404"/>
+                <a:cs typeface="Courier New" panose="02070309020205020404"/>
+              </a:rPr>
+              <a:t>=</a:t>
+            </a:r>
+            <a:r>
+              <a:rPr sz="2300" spc="-5" dirty="0">
+                <a:solidFill>
+                  <a:srgbClr val="3933FF"/>
+                </a:solidFill>
+                <a:latin typeface="Courier New" panose="02070309020205020404"/>
+                <a:cs typeface="Courier New" panose="02070309020205020404"/>
                 <a:hlinkClick r:id="rId2"/>
               </a:rPr>
-              <a:t>"http://www.w3.org/2001/XMLSchema-instance" </a:t>
-            </a:r>
-            <a:r>
-              <a:rPr sz="2300" spc="-1370" dirty="0">
-                <a:solidFill>
-                  <a:srgbClr val="3933FF"/>
-                </a:solidFill>
-                <a:latin typeface="Courier New" panose="02070309020205020404"/>
-                <a:cs typeface="Courier New" panose="02070309020205020404"/>
-              </a:rPr>
-              <a:t> </a:t>
-            </a:r>
-            <a:r>
-              <a:rPr sz="2300" spc="-5" dirty="0">
-                <a:solidFill>
-                  <a:srgbClr val="932192"/>
-                </a:solidFill>
-                <a:latin typeface="Courier New" panose="02070309020205020404"/>
-                <a:cs typeface="Courier New" panose="02070309020205020404"/>
-              </a:rPr>
-              <a:t>xsi:schemaLocation</a:t>
-            </a:r>
-            <a:r>
-              <a:rPr sz="2300" spc="-5" dirty="0">
-                <a:latin typeface="Courier New" panose="02070309020205020404"/>
-                <a:cs typeface="Courier New" panose="02070309020205020404"/>
-              </a:rPr>
-              <a:t>=</a:t>
-            </a:r>
-            <a:r>
-              <a:rPr sz="2300" spc="-5" dirty="0">
-                <a:solidFill>
-                  <a:srgbClr val="3933FF"/>
-                </a:solidFill>
-                <a:latin typeface="Courier New" panose="02070309020205020404"/>
-                <a:cs typeface="Courier New" panose="02070309020205020404"/>
-                <a:hlinkClick r:id="rId1"/>
-              </a:rPr>
               <a:t>"http://maven.apache.org/POM/4.0.0</a:t>
             </a:r>
-            <a:endParaRPr sz="2300">
+            <a:endParaRPr sz="2300" dirty="0">
               <a:latin typeface="Courier New" panose="02070309020205020404"/>
               <a:cs typeface="Courier New" panose="02070309020205020404"/>
             </a:endParaRPr>
@@ -5220,7 +5312,7 @@
                 </a:solidFill>
                 <a:latin typeface="Courier New" panose="02070309020205020404"/>
                 <a:cs typeface="Courier New" panose="02070309020205020404"/>
-                <a:hlinkClick r:id="rId3"/>
+                <a:hlinkClick r:id="rId4"/>
               </a:rPr>
               <a:t>http://maven.apache.org/maven-v4_0_0.xsd"</a:t>
             </a:r>
@@ -5234,7 +5326,7 @@
               </a:rPr>
               <a:t>&gt;</a:t>
             </a:r>
-            <a:endParaRPr sz="2300">
+            <a:endParaRPr sz="2300" dirty="0">
               <a:latin typeface="Courier New" panose="02070309020205020404"/>
               <a:cs typeface="Courier New" panose="02070309020205020404"/>
             </a:endParaRPr>
@@ -5248,7 +5340,7 @@
                 <a:spcPts val="10"/>
               </a:spcBef>
             </a:pPr>
-            <a:endParaRPr sz="2850">
+            <a:endParaRPr sz="2850" dirty="0">
               <a:latin typeface="Courier New" panose="02070309020205020404"/>
               <a:cs typeface="Courier New" panose="02070309020205020404"/>
             </a:endParaRPr>
@@ -5326,7 +5418,7 @@
               </a:rPr>
               <a:t>&gt;</a:t>
             </a:r>
-            <a:endParaRPr sz="2300">
+            <a:endParaRPr sz="2300" dirty="0">
               <a:latin typeface="Courier New" panose="02070309020205020404"/>
               <a:cs typeface="Courier New" panose="02070309020205020404"/>
             </a:endParaRPr>
@@ -5407,7 +5499,7 @@
               </a:rPr>
               <a:t>&gt;</a:t>
             </a:r>
-            <a:endParaRPr sz="2300">
+            <a:endParaRPr sz="2300" dirty="0">
               <a:latin typeface="Courier New" panose="02070309020205020404"/>
               <a:cs typeface="Courier New" panose="02070309020205020404"/>
             </a:endParaRPr>
@@ -5488,7 +5580,7 @@
               </a:rPr>
               <a:t>&gt;</a:t>
             </a:r>
-            <a:endParaRPr sz="2300">
+            <a:endParaRPr sz="2300" dirty="0">
               <a:latin typeface="Courier New" panose="02070309020205020404"/>
               <a:cs typeface="Courier New" panose="02070309020205020404"/>
             </a:endParaRPr>
@@ -5569,7 +5661,7 @@
               </a:rPr>
               <a:t>&gt;</a:t>
             </a:r>
-            <a:endParaRPr sz="2300">
+            <a:endParaRPr sz="2300" dirty="0">
               <a:latin typeface="Courier New" panose="02070309020205020404"/>
               <a:cs typeface="Courier New" panose="02070309020205020404"/>
             </a:endParaRPr>
@@ -5583,7 +5675,7 @@
                 <a:spcPts val="10"/>
               </a:spcBef>
             </a:pPr>
-            <a:endParaRPr sz="2850">
+            <a:endParaRPr sz="2850" dirty="0">
               <a:latin typeface="Courier New" panose="02070309020205020404"/>
               <a:cs typeface="Courier New" panose="02070309020205020404"/>
             </a:endParaRPr>
@@ -5624,7 +5716,7 @@
               </a:rPr>
               <a:t>&gt;</a:t>
             </a:r>
-            <a:endParaRPr sz="2300">
+            <a:endParaRPr sz="2300" dirty="0">
               <a:latin typeface="Courier New" panose="02070309020205020404"/>
               <a:cs typeface="Courier New" panose="02070309020205020404"/>
             </a:endParaRPr>
@@ -5668,7 +5760,7 @@
               </a:rPr>
               <a:t>&gt;</a:t>
             </a:r>
-            <a:endParaRPr sz="2300">
+            <a:endParaRPr sz="2300" dirty="0">
               <a:latin typeface="Courier New" panose="02070309020205020404"/>
               <a:cs typeface="Courier New" panose="02070309020205020404"/>
             </a:endParaRPr>
@@ -5749,7 +5841,7 @@
               </a:rPr>
               <a:t>&gt;</a:t>
             </a:r>
-            <a:endParaRPr sz="2300">
+            <a:endParaRPr sz="2300" dirty="0">
               <a:latin typeface="Courier New" panose="02070309020205020404"/>
               <a:cs typeface="Courier New" panose="02070309020205020404"/>
             </a:endParaRPr>
@@ -5830,7 +5922,7 @@
               </a:rPr>
               <a:t>&gt;</a:t>
             </a:r>
-            <a:endParaRPr sz="2300">
+            <a:endParaRPr sz="2300" dirty="0">
               <a:latin typeface="Courier New" panose="02070309020205020404"/>
               <a:cs typeface="Courier New" panose="02070309020205020404"/>
             </a:endParaRPr>
@@ -5911,7 +6003,7 @@
               </a:rPr>
               <a:t>&gt;</a:t>
             </a:r>
-            <a:endParaRPr sz="2300">
+            <a:endParaRPr sz="2300" dirty="0">
               <a:latin typeface="Courier New" panose="02070309020205020404"/>
               <a:cs typeface="Courier New" panose="02070309020205020404"/>
             </a:endParaRPr>
@@ -5955,7 +6047,7 @@
               </a:rPr>
               <a:t>&gt;</a:t>
             </a:r>
-            <a:endParaRPr sz="2300">
+            <a:endParaRPr sz="2300" dirty="0">
               <a:latin typeface="Courier New" panose="02070309020205020404"/>
               <a:cs typeface="Courier New" panose="02070309020205020404"/>
             </a:endParaRPr>
@@ -5999,7 +6091,7 @@
               </a:rPr>
               <a:t>&gt;</a:t>
             </a:r>
-            <a:endParaRPr sz="2300">
+            <a:endParaRPr sz="2300" dirty="0">
               <a:latin typeface="Courier New" panose="02070309020205020404"/>
               <a:cs typeface="Courier New" panose="02070309020205020404"/>
             </a:endParaRPr>
@@ -6013,7 +6105,7 @@
                 <a:spcPts val="10"/>
               </a:spcBef>
             </a:pPr>
-            <a:endParaRPr sz="2850">
+            <a:endParaRPr sz="2850" dirty="0">
               <a:latin typeface="Courier New" panose="02070309020205020404"/>
               <a:cs typeface="Courier New" panose="02070309020205020404"/>
             </a:endParaRPr>
@@ -6057,7 +6149,7 @@
               </a:rPr>
               <a:t>&gt;</a:t>
             </a:r>
-            <a:endParaRPr sz="2300">
+            <a:endParaRPr sz="2300" dirty="0">
               <a:latin typeface="Courier New" panose="02070309020205020404"/>
               <a:cs typeface="Courier New" panose="02070309020205020404"/>
             </a:endParaRPr>
@@ -6077,9 +6169,11 @@
         <p:spPr/>
         <p:txBody>
           <a:bodyPr/>
+          <a:lstStyle/>
           <a:p>
             <a:fld id="{B6F15528-21DE-4FAA-801E-634DDDAF4B2B}" type="slidenum">
               <a:rPr/>
+              <a:t>8</a:t>
             </a:fld>
             <a:endParaRPr/>
           </a:p>
@@ -6289,9 +6383,11 @@
         <p:spPr/>
         <p:txBody>
           <a:bodyPr/>
+          <a:lstStyle/>
           <a:p>
             <a:fld id="{B6F15528-21DE-4FAA-801E-634DDDAF4B2B}" type="slidenum">
               <a:rPr/>
+              <a:t>9</a:t>
             </a:fld>
             <a:endParaRPr/>
           </a:p>
@@ -6583,6 +6679,8 @@
       </a:bgFillStyleLst>
     </a:fmtScheme>
   </a:themeElements>
+  <a:objectDefaults/>
+  <a:extraClrSchemeLst/>
   <a:extLst>
     <a:ext uri="{05A4C25C-085E-4340-85A3-A5531E510DB2}">
       <thm15:themeFamily xmlns:thm15="http://schemas.microsoft.com/office/thememl/2012/main" name="Office Theme" id="{62F939B6-93AF-4DB8-9C6B-D6C7DFDC589F}" vid="{4A3C46E8-61CC-4603-A589-7422A47A8E4A}"/>
@@ -6842,6 +6940,8 @@
       </a:bgFillStyleLst>
     </a:fmtScheme>
   </a:themeElements>
+  <a:objectDefaults/>
+  <a:extraClrSchemeLst/>
   <a:extLst>
     <a:ext uri="{05A4C25C-085E-4340-85A3-A5531E510DB2}">
       <thm15:themeFamily xmlns:thm15="http://schemas.microsoft.com/office/thememl/2012/main" name="Office Theme" id="{62F939B6-93AF-4DB8-9C6B-D6C7DFDC589F}" vid="{4A3C46E8-61CC-4603-A589-7422A47A8E4A}"/>
@@ -7101,6 +7201,8 @@
       </a:bgFillStyleLst>
     </a:fmtScheme>
   </a:themeElements>
+  <a:objectDefaults/>
+  <a:extraClrSchemeLst/>
   <a:extLst>
     <a:ext uri="{05A4C25C-085E-4340-85A3-A5531E510DB2}">
       <thm15:themeFamily xmlns:thm15="http://schemas.microsoft.com/office/thememl/2012/main" name="Office Theme" id="{62F939B6-93AF-4DB8-9C6B-D6C7DFDC589F}" vid="{4A3C46E8-61CC-4603-A589-7422A47A8E4A}"/>

</xml_diff>